<commit_message>
Updated CC to C8
</commit_message>
<xml_diff>
--- a/docs/components/best-practices/architecture/deciding-about-your-stack-assets/greenfield-architecture.pptx
+++ b/docs/components/best-practices/architecture/deciding-about-your-stack-assets/greenfield-architecture.pptx
@@ -279,7 +279,7 @@
             <a:fld id="{80F06307-6088-4DFD-BB97-31C1E3C8F94D}" type="datetimeFigureOut">
               <a:rPr lang="en-US" smtClean="0"/>
               <a:pPr/>
-              <a:t>2/17/2022</a:t>
+              <a:t>4/26/2022</a:t>
             </a:fld>
             <a:endParaRPr lang="de-DE"/>
           </a:p>
@@ -449,7 +449,7 @@
             <a:fld id="{56E7BBA9-3E9F-478E-BBF6-AD90C451F165}" type="datetimeFigureOut">
               <a:rPr lang="en-GB" smtClean="0"/>
               <a:pPr/>
-              <a:t>17/02/2022</a:t>
+              <a:t>26/04/2022</a:t>
             </a:fld>
             <a:endParaRPr lang="en-GB"/>
           </a:p>
@@ -822,7 +822,7 @@
           <a:graphicData uri="http://schemas.openxmlformats.org/presentationml/2006/ole">
             <mc:AlternateContent xmlns:mc="http://schemas.openxmlformats.org/markup-compatibility/2006">
               <mc:Choice xmlns:v="urn:schemas-microsoft-com:vml" Requires="v">
-                <p:oleObj spid="_x0000_s2051" name="think-cell Slide" r:id="rId8" imgW="0" imgH="0" progId="TCLayout.ActiveDocument.1">
+                <p:oleObj spid="_x0000_s2052" name="think-cell Slide" r:id="rId8" imgW="0" imgH="0" progId="TCLayout.ActiveDocument.1">
                   <p:embed/>
                 </p:oleObj>
               </mc:Choice>
@@ -1080,7 +1080,7 @@
           <a:graphicData uri="http://schemas.openxmlformats.org/presentationml/2006/ole">
             <mc:AlternateContent xmlns:mc="http://schemas.openxmlformats.org/markup-compatibility/2006">
               <mc:Choice xmlns:v="urn:schemas-microsoft-com:vml" Requires="v">
-                <p:oleObj spid="_x0000_s3075" name="think-cell Slide" r:id="rId5" imgW="0" imgH="0" progId="TCLayout.ActiveDocument.1">
+                <p:oleObj spid="_x0000_s3076" name="think-cell Slide" r:id="rId5" imgW="0" imgH="0" progId="TCLayout.ActiveDocument.1">
                   <p:embed/>
                 </p:oleObj>
               </mc:Choice>
@@ -1390,7 +1390,7 @@
           <a:graphicData uri="http://schemas.openxmlformats.org/presentationml/2006/ole">
             <mc:AlternateContent xmlns:mc="http://schemas.openxmlformats.org/markup-compatibility/2006">
               <mc:Choice xmlns:v="urn:schemas-microsoft-com:vml" Requires="v">
-                <p:oleObj spid="_x0000_s4099" name="think-cell Slide" r:id="rId6" imgW="0" imgH="0" progId="TCLayout.ActiveDocument.1">
+                <p:oleObj spid="_x0000_s4100" name="think-cell Slide" r:id="rId6" imgW="0" imgH="0" progId="TCLayout.ActiveDocument.1">
                   <p:embed/>
                 </p:oleObj>
               </mc:Choice>
@@ -1737,7 +1737,7 @@
           <a:graphicData uri="http://schemas.openxmlformats.org/presentationml/2006/ole">
             <mc:AlternateContent xmlns:mc="http://schemas.openxmlformats.org/markup-compatibility/2006">
               <mc:Choice xmlns:v="urn:schemas-microsoft-com:vml" Requires="v">
-                <p:oleObj spid="_x0000_s5123" name="think-cell Slide" r:id="rId4" imgW="0" imgH="0" progId="TCLayout.ActiveDocument.1">
+                <p:oleObj spid="_x0000_s5124" name="think-cell Slide" r:id="rId4" imgW="0" imgH="0" progId="TCLayout.ActiveDocument.1">
                   <p:embed/>
                 </p:oleObj>
               </mc:Choice>
@@ -1940,7 +1940,7 @@
           <a:graphicData uri="http://schemas.openxmlformats.org/presentationml/2006/ole">
             <mc:AlternateContent xmlns:mc="http://schemas.openxmlformats.org/markup-compatibility/2006">
               <mc:Choice xmlns:v="urn:schemas-microsoft-com:vml" Requires="v">
-                <p:oleObj spid="_x0000_s6147" name="think-cell Slide" r:id="rId4" imgW="0" imgH="0" progId="TCLayout.ActiveDocument.1">
+                <p:oleObj spid="_x0000_s6148" name="think-cell Slide" r:id="rId4" imgW="0" imgH="0" progId="TCLayout.ActiveDocument.1">
                   <p:embed/>
                 </p:oleObj>
               </mc:Choice>
@@ -2143,7 +2143,7 @@
           <a:graphicData uri="http://schemas.openxmlformats.org/presentationml/2006/ole">
             <mc:AlternateContent xmlns:mc="http://schemas.openxmlformats.org/markup-compatibility/2006">
               <mc:Choice xmlns:v="urn:schemas-microsoft-com:vml" Requires="v">
-                <p:oleObj spid="_x0000_s7171" name="think-cell Slide" r:id="rId4" imgW="0" imgH="0" progId="TCLayout.ActiveDocument.1">
+                <p:oleObj spid="_x0000_s7172" name="think-cell Slide" r:id="rId4" imgW="0" imgH="0" progId="TCLayout.ActiveDocument.1">
                   <p:embed/>
                 </p:oleObj>
               </mc:Choice>
@@ -2264,7 +2264,7 @@
           <a:graphicData uri="http://schemas.openxmlformats.org/presentationml/2006/ole">
             <mc:AlternateContent xmlns:mc="http://schemas.openxmlformats.org/markup-compatibility/2006">
               <mc:Choice xmlns:v="urn:schemas-microsoft-com:vml" Requires="v">
-                <p:oleObj spid="_x0000_s8195" name="think-cell Slide" r:id="rId4" imgW="0" imgH="0" progId="TCLayout.ActiveDocument.1">
+                <p:oleObj spid="_x0000_s8196" name="think-cell Slide" r:id="rId4" imgW="0" imgH="0" progId="TCLayout.ActiveDocument.1">
                   <p:embed/>
                 </p:oleObj>
               </mc:Choice>
@@ -2475,7 +2475,7 @@
           <a:graphicData uri="http://schemas.openxmlformats.org/presentationml/2006/ole">
             <mc:AlternateContent xmlns:mc="http://schemas.openxmlformats.org/markup-compatibility/2006">
               <mc:Choice xmlns:v="urn:schemas-microsoft-com:vml" Requires="v">
-                <p:oleObj spid="_x0000_s9219" name="think-cell Slide" r:id="rId4" imgW="0" imgH="0" progId="TCLayout.ActiveDocument.1">
+                <p:oleObj spid="_x0000_s9220" name="think-cell Slide" r:id="rId4" imgW="0" imgH="0" progId="TCLayout.ActiveDocument.1">
                   <p:embed/>
                 </p:oleObj>
               </mc:Choice>
@@ -2635,7 +2635,7 @@
           <a:graphicData uri="http://schemas.openxmlformats.org/presentationml/2006/ole">
             <mc:AlternateContent xmlns:mc="http://schemas.openxmlformats.org/markup-compatibility/2006">
               <mc:Choice xmlns:v="urn:schemas-microsoft-com:vml" Requires="v">
-                <p:oleObj spid="_x0000_s10243" name="think-cell Slide" r:id="rId18" imgW="0" imgH="0" progId="TCLayout.ActiveDocument.1">
+                <p:oleObj spid="_x0000_s10244" name="think-cell Slide" r:id="rId18" imgW="0" imgH="0" progId="TCLayout.ActiveDocument.1">
                   <p:embed/>
                 </p:oleObj>
               </mc:Choice>
@@ -3782,7 +3782,7 @@
           <a:graphicData uri="http://schemas.openxmlformats.org/presentationml/2006/ole">
             <mc:AlternateContent xmlns:mc="http://schemas.openxmlformats.org/markup-compatibility/2006">
               <mc:Choice xmlns:v="urn:schemas-microsoft-com:vml" Requires="v">
-                <p:oleObj spid="_x0000_s1027" name="think-cell Slide" r:id="rId16" imgW="0" imgH="0" progId="TCLayout.ActiveDocument.1">
+                <p:oleObj spid="_x0000_s1028" name="think-cell Slide" r:id="rId16" imgW="0" imgH="0" progId="TCLayout.ActiveDocument.1">
                   <p:embed/>
                 </p:oleObj>
               </mc:Choice>
@@ -5464,7 +5464,7 @@
         <p:spPr>
           <a:xfrm>
             <a:off x="-1240647" y="2353191"/>
-            <a:ext cx="1424603" cy="369332"/>
+            <a:ext cx="1791691" cy="369332"/>
           </a:xfrm>
           <a:prstGeom prst="rect">
             <a:avLst/>
@@ -5481,7 +5481,19 @@
               <a:rPr lang="de-DE" sz="1200" dirty="0">
                 <a:latin typeface="+mn-lt"/>
               </a:rPr>
-              <a:t>Camunda Cloud </a:t>
+              <a:t>Camunda </a:t>
+            </a:r>
+            <a:r>
+              <a:rPr lang="de-DE" sz="1200" dirty="0" err="1">
+                <a:latin typeface="+mn-lt"/>
+              </a:rPr>
+              <a:t>Platform</a:t>
+            </a:r>
+            <a:r>
+              <a:rPr lang="de-DE" sz="1200" dirty="0">
+                <a:latin typeface="+mn-lt"/>
+              </a:rPr>
+              <a:t> 8 </a:t>
             </a:r>
           </a:p>
           <a:p>

</xml_diff>